<commit_message>
phi.pptx, euler-example, format CP_Euler_theorem_not_rel_prime.
</commit_message>
<xml_diff>
--- a/spring12/slidesS12/phi.pptx
+++ b/spring12/slidesS12/phi.pptx
@@ -4063,13 +4063,8 @@
             <a:pPr eaLnBrk="1" hangingPunct="1"/>
             <a:r>
               <a:rPr lang="en-US" sz="8000" b="1" dirty="0" smtClean="0"/>
-              <a:t>Euler’s </a:t>
-            </a:r>
-            <a:r>
-              <a:rPr lang="en-US" sz="8000" b="1" dirty="0" smtClean="0"/>
-              <a:t>Function</a:t>
-            </a:r>
-            <a:endParaRPr lang="en-US" sz="8000" b="1" dirty="0" smtClean="0"/>
+              <a:t>Euler’s Function</a:t>
+            </a:r>
           </a:p>
         </p:txBody>
       </p:sp>
@@ -4512,7 +4507,7 @@
                             </p:stCondLst>
                             <p:childTnLst>
                               <p:par>
-                                <p:cTn id="5" presetID="9" presetClass="entr" presetSubtype="0" fill="hold" grpId="0" nodeType="clickEffect">
+                                <p:cTn id="5" presetID="22" presetClass="entr" presetSubtype="8" fill="hold" grpId="0" nodeType="clickEffect">
                                   <p:stCondLst>
                                     <p:cond delay="0"/>
                                   </p:stCondLst>
@@ -4520,59 +4515,6 @@
                                     <p:set>
                                       <p:cBhvr>
                                         <p:cTn id="6" dur="1" fill="hold">
-                                          <p:stCondLst>
-                                            <p:cond delay="0"/>
-                                          </p:stCondLst>
-                                        </p:cTn>
-                                        <p:tgtEl>
-                                          <p:spTgt spid="24580"/>
-                                        </p:tgtEl>
-                                        <p:attrNameLst>
-                                          <p:attrName>style.visibility</p:attrName>
-                                        </p:attrNameLst>
-                                      </p:cBhvr>
-                                      <p:to>
-                                        <p:strVal val="visible"/>
-                                      </p:to>
-                                    </p:set>
-                                    <p:animEffect transition="in" filter="dissolve">
-                                      <p:cBhvr>
-                                        <p:cTn id="7" dur="500"/>
-                                        <p:tgtEl>
-                                          <p:spTgt spid="24580"/>
-                                        </p:tgtEl>
-                                      </p:cBhvr>
-                                    </p:animEffect>
-                                  </p:childTnLst>
-                                </p:cTn>
-                              </p:par>
-                            </p:childTnLst>
-                          </p:cTn>
-                        </p:par>
-                      </p:childTnLst>
-                    </p:cTn>
-                  </p:par>
-                  <p:par>
-                    <p:cTn id="8" fill="hold">
-                      <p:stCondLst>
-                        <p:cond delay="indefinite"/>
-                      </p:stCondLst>
-                      <p:childTnLst>
-                        <p:par>
-                          <p:cTn id="9" fill="hold">
-                            <p:stCondLst>
-                              <p:cond delay="0"/>
-                            </p:stCondLst>
-                            <p:childTnLst>
-                              <p:par>
-                                <p:cTn id="10" presetID="22" presetClass="entr" presetSubtype="8" fill="hold" grpId="0" nodeType="clickEffect">
-                                  <p:stCondLst>
-                                    <p:cond delay="0"/>
-                                  </p:stCondLst>
-                                  <p:childTnLst>
-                                    <p:set>
-                                      <p:cBhvr>
-                                        <p:cTn id="11" dur="1" fill="hold">
                                           <p:stCondLst>
                                             <p:cond delay="0"/>
                                           </p:stCondLst>
@@ -4590,7 +4532,7 @@
                                     </p:set>
                                     <p:animEffect transition="in" filter="wipe(left)">
                                       <p:cBhvr>
-                                        <p:cTn id="12" dur="1000"/>
+                                        <p:cTn id="7" dur="1000"/>
                                         <p:tgtEl>
                                           <p:spTgt spid="394247"/>
                                         </p:tgtEl>
@@ -4627,7 +4569,6 @@
       </p:par>
     </p:tnLst>
     <p:bldLst>
-      <p:bldP spid="24580" grpId="0"/>
       <p:bldP spid="394247" grpId="0" animBg="1"/>
     </p:bldLst>
   </p:timing>
@@ -13589,8 +13530,8 @@
         </p:nvSpPr>
         <p:spPr>
           <a:xfrm>
-            <a:off x="304800" y="3276600"/>
-            <a:ext cx="8765207" cy="1107996"/>
+            <a:off x="152400" y="3276600"/>
+            <a:ext cx="8763000" cy="1143000"/>
           </a:xfrm>
           <a:prstGeom prst="rect">
             <a:avLst/>
@@ -13598,7 +13539,7 @@
           <a:noFill/>
         </p:spPr>
         <p:txBody>
-          <a:bodyPr wrap="none" rtlCol="0">
+          <a:bodyPr wrap="square" rtlCol="0">
             <a:spAutoFit/>
           </a:bodyPr>
           <a:lstStyle/>
@@ -13625,7 +13566,7 @@
                 <a:cs typeface="Comic Sans MS"/>
                 <a:sym typeface="Euclid Symbol"/>
               </a:rPr>
-              <a:t>} </a:t>
+              <a:t>}</a:t>
             </a:r>
             <a:r>
               <a:rPr lang="en-US" sz="6600" dirty="0" smtClean="0">
@@ -13649,7 +13590,27 @@
               <a:t>= </a:t>
             </a:r>
             <a:r>
-              <a:rPr lang="en-US" sz="6600" dirty="0" smtClean="0">
+              <a:rPr lang="en-US" sz="6600" b="1" dirty="0" smtClean="0">
+                <a:solidFill>
+                  <a:srgbClr val="000000"/>
+                </a:solidFill>
+                <a:latin typeface="Euclid Symbol" charset="2"/>
+                <a:cs typeface="Euclid Symbol" charset="2"/>
+                <a:sym typeface="Euclid Symbol"/>
+              </a:rPr>
+              <a:t> </a:t>
+            </a:r>
+            <a:r>
+              <a:rPr lang="en-US" sz="6000" dirty="0" smtClean="0">
+                <a:solidFill>
+                  <a:srgbClr val="000000"/>
+                </a:solidFill>
+                <a:latin typeface="Comic Sans MS" pitchFamily="66" charset="0"/>
+              </a:rPr>
+              <a:t>{</a:t>
+            </a:r>
+            <a:r>
+              <a:rPr lang="en-US" sz="6000" dirty="0" smtClean="0">
                 <a:solidFill>
                   <a:srgbClr val="008000"/>
                 </a:solidFill>
@@ -13657,12 +13618,27 @@
               </a:rPr>
               <a:t>1,2,3,4,5,6</a:t>
             </a:r>
+            <a:r>
+              <a:rPr lang="en-US" sz="6000" dirty="0" smtClean="0">
+                <a:solidFill>
+                  <a:srgbClr val="000000"/>
+                </a:solidFill>
+                <a:latin typeface="Comic Sans MS" pitchFamily="66" charset="0"/>
+              </a:rPr>
+              <a:t>}</a:t>
+            </a:r>
+            <a:endParaRPr lang="en-US" sz="6000" dirty="0" smtClean="0">
+              <a:solidFill>
+                <a:srgbClr val="000000"/>
+              </a:solidFill>
+              <a:latin typeface="Comic Sans MS" pitchFamily="66" charset="0"/>
+            </a:endParaRPr>
           </a:p>
         </p:txBody>
       </p:sp>
       <p:sp>
         <p:nvSpPr>
-          <p:cNvPr id="7" name="Text Box 7"/>
+          <p:cNvPr id="9" name="Text Box 7"/>
           <p:cNvSpPr txBox="1">
             <a:spLocks noChangeArrowheads="1"/>
           </p:cNvSpPr>
@@ -13670,8 +13646,8 @@
         </p:nvSpPr>
         <p:spPr bwMode="auto">
           <a:xfrm>
-            <a:off x="152400" y="4343400"/>
-            <a:ext cx="8839755" cy="2215991"/>
+            <a:off x="0" y="4343400"/>
+            <a:ext cx="9144000" cy="2179058"/>
           </a:xfrm>
           <a:prstGeom prst="rect">
             <a:avLst/>
@@ -13685,7 +13661,7 @@
           </a:ln>
         </p:spPr>
         <p:txBody>
-          <a:bodyPr wrap="none">
+          <a:bodyPr wrap="square">
             <a:spAutoFit/>
           </a:bodyPr>
           <a:lstStyle/>
@@ -13769,20 +13745,27 @@
               <a:spcBef>
                 <a:spcPct val="20000"/>
               </a:spcBef>
-              <a:buFont typeface="Symbol" pitchFamily="18" charset="2"/>
-              <a:buNone/>
             </a:pPr>
             <a:r>
-              <a:rPr lang="en-US" sz="6000" dirty="0" smtClean="0">
+              <a:rPr lang="en-US" sz="5800" dirty="0" smtClean="0">
+                <a:solidFill>
+                  <a:srgbClr val="000000"/>
+                </a:solidFill>
+                <a:latin typeface="Comic Sans MS" pitchFamily="66" charset="0"/>
+              </a:rPr>
+              <a:t> {</a:t>
+            </a:r>
+            <a:r>
+              <a:rPr lang="en-US" sz="5800" dirty="0" smtClean="0">
                 <a:solidFill>
                   <a:schemeClr val="accent2"/>
                 </a:solidFill>
                 <a:latin typeface="Comic Sans MS" pitchFamily="66" charset="0"/>
               </a:rPr>
-              <a:t> 0,</a:t>
-            </a:r>
-            <a:r>
-              <a:rPr lang="en-US" sz="6000" dirty="0" smtClean="0">
+              <a:t>0,</a:t>
+            </a:r>
+            <a:r>
+              <a:rPr lang="en-US" sz="5800" dirty="0" smtClean="0">
                 <a:solidFill>
                   <a:srgbClr val="008000"/>
                 </a:solidFill>
@@ -13791,7 +13774,7 @@
               <a:t>1,</a:t>
             </a:r>
             <a:r>
-              <a:rPr lang="en-US" sz="6000" dirty="0" smtClean="0">
+              <a:rPr lang="en-US" sz="5800" dirty="0" smtClean="0">
                 <a:solidFill>
                   <a:schemeClr val="accent2"/>
                 </a:solidFill>
@@ -13800,7 +13783,7 @@
               <a:t>2,3,4</a:t>
             </a:r>
             <a:r>
-              <a:rPr lang="en-US" sz="6000" dirty="0" smtClean="0">
+              <a:rPr lang="en-US" sz="5800" dirty="0" smtClean="0">
                 <a:solidFill>
                   <a:srgbClr val="008000"/>
                 </a:solidFill>
@@ -13809,7 +13792,7 @@
               <a:t>,5,</a:t>
             </a:r>
             <a:r>
-              <a:rPr lang="en-US" sz="6000" dirty="0" smtClean="0">
+              <a:rPr lang="en-US" sz="5800" dirty="0" smtClean="0">
                 <a:solidFill>
                   <a:schemeClr val="accent2"/>
                 </a:solidFill>
@@ -13818,7 +13801,7 @@
               <a:t>6</a:t>
             </a:r>
             <a:r>
-              <a:rPr lang="en-US" sz="6000" dirty="0" smtClean="0">
+              <a:rPr lang="en-US" sz="5800" dirty="0" smtClean="0">
                 <a:solidFill>
                   <a:srgbClr val="008000"/>
                 </a:solidFill>
@@ -13827,7 +13810,7 @@
               <a:t>,7,</a:t>
             </a:r>
             <a:r>
-              <a:rPr lang="en-US" sz="6000" dirty="0" smtClean="0">
+              <a:rPr lang="en-US" sz="5800" dirty="0" smtClean="0">
                 <a:solidFill>
                   <a:schemeClr val="accent2"/>
                 </a:solidFill>
@@ -13836,7 +13819,7 @@
               <a:t>8,9,10</a:t>
             </a:r>
             <a:r>
-              <a:rPr lang="en-US" sz="6000" dirty="0" smtClean="0">
+              <a:rPr lang="en-US" sz="5800" dirty="0" smtClean="0">
                 <a:solidFill>
                   <a:srgbClr val="008000"/>
                 </a:solidFill>
@@ -13844,7 +13827,18 @@
               </a:rPr>
               <a:t>,11</a:t>
             </a:r>
-            <a:endParaRPr lang="en-US" sz="5400" dirty="0"/>
+            <a:r>
+              <a:rPr lang="en-US" sz="5800" kern="0" dirty="0">
+                <a:solidFill>
+                  <a:srgbClr val="000000"/>
+                </a:solidFill>
+                <a:latin typeface="Comic Sans MS"/>
+                <a:cs typeface="Courier New" pitchFamily="49" charset="0"/>
+                <a:sym typeface="Euclid Symbol" pitchFamily="18" charset="2"/>
+              </a:rPr>
+              <a:t>}</a:t>
+            </a:r>
+            <a:endParaRPr lang="en-US" sz="5800" dirty="0"/>
           </a:p>
         </p:txBody>
       </p:sp>
@@ -13938,7 +13932,7 @@
                             </p:stCondLst>
                             <p:childTnLst>
                               <p:par>
-                                <p:cTn id="10" presetID="9" presetClass="entr" presetSubtype="0" fill="hold" grpId="0" nodeType="clickEffect">
+                                <p:cTn id="10" presetID="22" presetClass="entr" presetSubtype="8" fill="hold" grpId="0" nodeType="clickEffect">
                                   <p:stCondLst>
                                     <p:cond delay="0"/>
                                   </p:stCondLst>
@@ -13951,72 +13945,7 @@
                                           </p:stCondLst>
                                         </p:cTn>
                                         <p:tgtEl>
-                                          <p:spTgt spid="7">
-                                            <p:txEl>
-                                              <p:pRg st="0" end="0"/>
-                                            </p:txEl>
-                                          </p:spTgt>
-                                        </p:tgtEl>
-                                        <p:attrNameLst>
-                                          <p:attrName>style.visibility</p:attrName>
-                                        </p:attrNameLst>
-                                      </p:cBhvr>
-                                      <p:to>
-                                        <p:strVal val="visible"/>
-                                      </p:to>
-                                    </p:set>
-                                    <p:animEffect transition="in" filter="dissolve">
-                                      <p:cBhvr>
-                                        <p:cTn id="12" dur="500"/>
-                                        <p:tgtEl>
-                                          <p:spTgt spid="7">
-                                            <p:txEl>
-                                              <p:pRg st="0" end="0"/>
-                                            </p:txEl>
-                                          </p:spTgt>
-                                        </p:tgtEl>
-                                      </p:cBhvr>
-                                    </p:animEffect>
-                                  </p:childTnLst>
-                                </p:cTn>
-                              </p:par>
-                            </p:childTnLst>
-                          </p:cTn>
-                        </p:par>
-                      </p:childTnLst>
-                    </p:cTn>
-                  </p:par>
-                  <p:par>
-                    <p:cTn id="13" fill="hold">
-                      <p:stCondLst>
-                        <p:cond delay="indefinite"/>
-                      </p:stCondLst>
-                      <p:childTnLst>
-                        <p:par>
-                          <p:cTn id="14" fill="hold">
-                            <p:stCondLst>
-                              <p:cond delay="0"/>
-                            </p:stCondLst>
-                            <p:childTnLst>
-                              <p:par>
-                                <p:cTn id="15" presetID="22" presetClass="entr" presetSubtype="8" fill="hold" grpId="0" nodeType="clickEffect">
-                                  <p:stCondLst>
-                                    <p:cond delay="0"/>
-                                  </p:stCondLst>
-                                  <p:childTnLst>
-                                    <p:set>
-                                      <p:cBhvr>
-                                        <p:cTn id="16" dur="1" fill="hold">
-                                          <p:stCondLst>
-                                            <p:cond delay="0"/>
-                                          </p:stCondLst>
-                                        </p:cTn>
-                                        <p:tgtEl>
-                                          <p:spTgt spid="7">
-                                            <p:txEl>
-                                              <p:pRg st="1" end="1"/>
-                                            </p:txEl>
-                                          </p:spTgt>
+                                          <p:spTgt spid="9"/>
                                         </p:tgtEl>
                                         <p:attrNameLst>
                                           <p:attrName>style.visibility</p:attrName>
@@ -14028,13 +13957,9 @@
                                     </p:set>
                                     <p:animEffect transition="in" filter="wipe(left)">
                                       <p:cBhvr>
-                                        <p:cTn id="17" dur="1000"/>
+                                        <p:cTn id="12" dur="500"/>
                                         <p:tgtEl>
-                                          <p:spTgt spid="7">
-                                            <p:txEl>
-                                              <p:pRg st="1" end="1"/>
-                                            </p:txEl>
-                                          </p:spTgt>
+                                          <p:spTgt spid="9"/>
                                         </p:tgtEl>
                                       </p:cBhvr>
                                     </p:animEffect>
@@ -14070,7 +13995,7 @@
     </p:tnLst>
     <p:bldLst>
       <p:bldP spid="3" grpId="0"/>
-      <p:bldP spid="7" grpId="0" build="allAtOnce"/>
+      <p:bldP spid="9" grpId="0"/>
     </p:bldLst>
   </p:timing>
 </p:sld>
@@ -14422,14 +14347,14 @@
       </p:sp>
       <p:sp>
         <p:nvSpPr>
-          <p:cNvPr id="3" name="TextBox 2"/>
+          <p:cNvPr id="9" name="TextBox 8"/>
           <p:cNvSpPr txBox="1"/>
           <p:nvPr/>
         </p:nvSpPr>
         <p:spPr>
           <a:xfrm>
-            <a:off x="595188" y="3276600"/>
-            <a:ext cx="8539029" cy="1107996"/>
+            <a:off x="76200" y="3276600"/>
+            <a:ext cx="8991600" cy="1107996"/>
           </a:xfrm>
           <a:prstGeom prst="rect">
             <a:avLst/>
@@ -14437,7 +14362,7 @@
           <a:noFill/>
         </p:spPr>
         <p:txBody>
-          <a:bodyPr wrap="none" rtlCol="0">
+          <a:bodyPr wrap="square" rtlCol="0">
             <a:spAutoFit/>
           </a:bodyPr>
           <a:lstStyle/>
@@ -14453,7 +14378,7 @@
                 <a:cs typeface="Comic Sans MS"/>
                 <a:sym typeface="Euclid Symbol"/>
               </a:rPr>
-              <a:t> </a:t>
+              <a:t>  </a:t>
             </a:r>
             <a:r>
               <a:rPr lang="en-US" sz="6600" dirty="0" smtClean="0">
@@ -14480,7 +14405,7 @@
               <a:t>φ</a:t>
             </a:r>
             <a:r>
-              <a:rPr lang="en-US" sz="6600" dirty="0" smtClean="0">
+              <a:rPr lang="en-US" sz="6600" dirty="0">
                 <a:solidFill>
                   <a:schemeClr val="accent1">
                     <a:lumMod val="50000"/>
@@ -14490,28 +14415,42 @@
                 <a:cs typeface="Comic Sans MS"/>
                 <a:sym typeface="Euclid Symbol"/>
               </a:rPr>
-              <a:t>{7</a:t>
+              <a:t>(</a:t>
             </a:r>
             <a:r>
               <a:rPr lang="en-US" sz="6600" dirty="0" smtClean="0">
                 <a:solidFill>
-                  <a:srgbClr val="0000CC"/>
+                  <a:schemeClr val="accent1">
+                    <a:lumMod val="50000"/>
+                  </a:schemeClr>
                 </a:solidFill>
                 <a:latin typeface="Comic Sans MS"/>
                 <a:cs typeface="Comic Sans MS"/>
                 <a:sym typeface="Euclid Symbol"/>
               </a:rPr>
-              <a:t>} </a:t>
-            </a:r>
-            <a:r>
-              <a:rPr lang="en-US" sz="6600" dirty="0" smtClean="0">
+              <a:t>7</a:t>
+            </a:r>
+            <a:r>
+              <a:rPr lang="en-US" sz="6600" dirty="0">
                 <a:solidFill>
                   <a:srgbClr val="0000CC"/>
                 </a:solidFill>
+                <a:latin typeface="Comic Sans MS"/>
                 <a:cs typeface="Comic Sans MS"/>
                 <a:sym typeface="Euclid Symbol"/>
               </a:rPr>
-              <a:t> </a:t>
+              <a:t>)</a:t>
+            </a:r>
+            <a:r>
+              <a:rPr lang="en-US" sz="6600" dirty="0" smtClean="0">
+                <a:solidFill>
+                  <a:srgbClr val="0000CC"/>
+                </a:solidFill>
+                <a:latin typeface="Comic Sans MS"/>
+                <a:cs typeface="Comic Sans MS"/>
+                <a:sym typeface="Euclid Symbol"/>
+              </a:rPr>
+              <a:t>  </a:t>
             </a:r>
             <a:r>
               <a:rPr lang="en-US" sz="6600" b="1" dirty="0" smtClean="0">
@@ -14522,17 +14461,7 @@
                 <a:cs typeface="Euclid Symbol" charset="2"/>
                 <a:sym typeface="Euclid Symbol"/>
               </a:rPr>
-              <a:t>=</a:t>
-            </a:r>
-            <a:r>
-              <a:rPr lang="en-US" sz="6600" dirty="0" smtClean="0">
-                <a:solidFill>
-                  <a:srgbClr val="0000CC"/>
-                </a:solidFill>
-                <a:cs typeface="Comic Sans MS"/>
-                <a:sym typeface="Euclid Symbol"/>
-              </a:rPr>
-              <a:t> </a:t>
+              <a:t>= </a:t>
             </a:r>
             <a:r>
               <a:rPr lang="en-US" sz="6000" kern="0" dirty="0">
@@ -14546,13 +14475,31 @@
               <a:t>|</a:t>
             </a:r>
             <a:r>
-              <a:rPr lang="en-US" sz="6600" dirty="0" smtClean="0">
+              <a:rPr lang="en-US" sz="6000" dirty="0" smtClean="0">
+                <a:solidFill>
+                  <a:srgbClr val="000000"/>
+                </a:solidFill>
+                <a:latin typeface="Comic Sans MS" pitchFamily="66" charset="0"/>
+              </a:rPr>
+              <a:t>{</a:t>
+            </a:r>
+            <a:r>
+              <a:rPr lang="en-US" sz="6000" dirty="0" smtClean="0">
                 <a:solidFill>
                   <a:srgbClr val="008000"/>
                 </a:solidFill>
                 <a:latin typeface="Comic Sans MS" pitchFamily="66" charset="0"/>
               </a:rPr>
               <a:t>1,2,3,4,5,6</a:t>
+            </a:r>
+            <a:r>
+              <a:rPr lang="en-US" sz="6000" dirty="0" smtClean="0">
+                <a:solidFill>
+                  <a:srgbClr val="000000"/>
+                </a:solidFill>
+                <a:latin typeface="Comic Sans MS" pitchFamily="66" charset="0"/>
+              </a:rPr>
+              <a:t>}</a:t>
             </a:r>
             <a:r>
               <a:rPr lang="en-US" sz="6000" kern="0" dirty="0">
@@ -14565,9 +14512,9 @@
               </a:rPr>
               <a:t>|</a:t>
             </a:r>
-            <a:endParaRPr lang="en-US" sz="6600" dirty="0" smtClean="0">
+            <a:endParaRPr lang="en-US" sz="6000" dirty="0" smtClean="0">
               <a:solidFill>
-                <a:srgbClr val="008000"/>
+                <a:srgbClr val="000000"/>
               </a:solidFill>
               <a:latin typeface="Comic Sans MS" pitchFamily="66" charset="0"/>
             </a:endParaRPr>
@@ -14576,7 +14523,7 @@
       </p:sp>
       <p:sp>
         <p:nvSpPr>
-          <p:cNvPr id="7" name="Text Box 7"/>
+          <p:cNvPr id="10" name="Text Box 7"/>
           <p:cNvSpPr txBox="1">
             <a:spLocks noChangeArrowheads="1"/>
           </p:cNvSpPr>
@@ -14584,8 +14531,8 @@
         </p:nvSpPr>
         <p:spPr bwMode="auto">
           <a:xfrm>
-            <a:off x="152400" y="4343400"/>
-            <a:ext cx="8839755" cy="2215991"/>
+            <a:off x="0" y="4343400"/>
+            <a:ext cx="9144000" cy="2179058"/>
           </a:xfrm>
           <a:prstGeom prst="rect">
             <a:avLst/>
@@ -14599,7 +14546,7 @@
           </a:ln>
         </p:spPr>
         <p:txBody>
-          <a:bodyPr wrap="none">
+          <a:bodyPr wrap="square">
             <a:spAutoFit/>
           </a:bodyPr>
           <a:lstStyle/>
@@ -14683,20 +14630,27 @@
               <a:spcBef>
                 <a:spcPct val="20000"/>
               </a:spcBef>
-              <a:buFont typeface="Symbol" pitchFamily="18" charset="2"/>
-              <a:buNone/>
             </a:pPr>
             <a:r>
-              <a:rPr lang="en-US" sz="6000" dirty="0" smtClean="0">
+              <a:rPr lang="en-US" sz="5800" dirty="0" smtClean="0">
+                <a:solidFill>
+                  <a:srgbClr val="000000"/>
+                </a:solidFill>
+                <a:latin typeface="Comic Sans MS" pitchFamily="66" charset="0"/>
+              </a:rPr>
+              <a:t> {</a:t>
+            </a:r>
+            <a:r>
+              <a:rPr lang="en-US" sz="5800" dirty="0" smtClean="0">
                 <a:solidFill>
                   <a:schemeClr val="accent2"/>
                 </a:solidFill>
                 <a:latin typeface="Comic Sans MS" pitchFamily="66" charset="0"/>
               </a:rPr>
-              <a:t> 0,</a:t>
-            </a:r>
-            <a:r>
-              <a:rPr lang="en-US" sz="6000" dirty="0" smtClean="0">
+              <a:t>0,</a:t>
+            </a:r>
+            <a:r>
+              <a:rPr lang="en-US" sz="5800" dirty="0" smtClean="0">
                 <a:solidFill>
                   <a:srgbClr val="008000"/>
                 </a:solidFill>
@@ -14705,7 +14659,7 @@
               <a:t>1,</a:t>
             </a:r>
             <a:r>
-              <a:rPr lang="en-US" sz="6000" dirty="0" smtClean="0">
+              <a:rPr lang="en-US" sz="5800" dirty="0" smtClean="0">
                 <a:solidFill>
                   <a:schemeClr val="accent2"/>
                 </a:solidFill>
@@ -14714,7 +14668,7 @@
               <a:t>2,3,4</a:t>
             </a:r>
             <a:r>
-              <a:rPr lang="en-US" sz="6000" dirty="0" smtClean="0">
+              <a:rPr lang="en-US" sz="5800" dirty="0" smtClean="0">
                 <a:solidFill>
                   <a:srgbClr val="008000"/>
                 </a:solidFill>
@@ -14723,7 +14677,7 @@
               <a:t>,5,</a:t>
             </a:r>
             <a:r>
-              <a:rPr lang="en-US" sz="6000" dirty="0" smtClean="0">
+              <a:rPr lang="en-US" sz="5800" dirty="0" smtClean="0">
                 <a:solidFill>
                   <a:schemeClr val="accent2"/>
                 </a:solidFill>
@@ -14732,7 +14686,7 @@
               <a:t>6</a:t>
             </a:r>
             <a:r>
-              <a:rPr lang="en-US" sz="6000" dirty="0" smtClean="0">
+              <a:rPr lang="en-US" sz="5800" dirty="0" smtClean="0">
                 <a:solidFill>
                   <a:srgbClr val="008000"/>
                 </a:solidFill>
@@ -14741,7 +14695,7 @@
               <a:t>,7,</a:t>
             </a:r>
             <a:r>
-              <a:rPr lang="en-US" sz="6000" dirty="0" smtClean="0">
+              <a:rPr lang="en-US" sz="5800" dirty="0" smtClean="0">
                 <a:solidFill>
                   <a:schemeClr val="accent2"/>
                 </a:solidFill>
@@ -14750,7 +14704,7 @@
               <a:t>8,9,10</a:t>
             </a:r>
             <a:r>
-              <a:rPr lang="en-US" sz="6000" dirty="0" smtClean="0">
+              <a:rPr lang="en-US" sz="5800" dirty="0" smtClean="0">
                 <a:solidFill>
                   <a:srgbClr val="008000"/>
                 </a:solidFill>
@@ -14758,7 +14712,18 @@
               </a:rPr>
               <a:t>,11</a:t>
             </a:r>
-            <a:endParaRPr lang="en-US" sz="5400" dirty="0"/>
+            <a:r>
+              <a:rPr lang="en-US" sz="5800" kern="0" dirty="0">
+                <a:solidFill>
+                  <a:srgbClr val="000000"/>
+                </a:solidFill>
+                <a:latin typeface="Comic Sans MS"/>
+                <a:cs typeface="Courier New" pitchFamily="49" charset="0"/>
+                <a:sym typeface="Euclid Symbol" pitchFamily="18" charset="2"/>
+              </a:rPr>
+              <a:t>}</a:t>
+            </a:r>
+            <a:endParaRPr lang="en-US" sz="5800" dirty="0"/>
           </a:p>
         </p:txBody>
       </p:sp>
@@ -15146,7 +15111,7 @@
         </p:nvSpPr>
         <p:spPr>
           <a:xfrm>
-            <a:off x="595188" y="3276600"/>
+            <a:off x="381000" y="3276600"/>
             <a:ext cx="5117907" cy="1107996"/>
           </a:xfrm>
           <a:prstGeom prst="rect">
@@ -15198,7 +15163,7 @@
               <a:t>φ</a:t>
             </a:r>
             <a:r>
-              <a:rPr lang="en-US" sz="6600" dirty="0" smtClean="0">
+              <a:rPr lang="en-US" sz="6600" dirty="0">
                 <a:solidFill>
                   <a:schemeClr val="accent1">
                     <a:lumMod val="50000"/>
@@ -15208,18 +15173,42 @@
                 <a:cs typeface="Comic Sans MS"/>
                 <a:sym typeface="Euclid Symbol"/>
               </a:rPr>
-              <a:t>{7</a:t>
+              <a:t>(</a:t>
             </a:r>
             <a:r>
               <a:rPr lang="en-US" sz="6600" dirty="0" smtClean="0">
                 <a:solidFill>
-                  <a:srgbClr val="0000CC"/>
+                  <a:schemeClr val="accent1">
+                    <a:lumMod val="50000"/>
+                  </a:schemeClr>
                 </a:solidFill>
                 <a:latin typeface="Comic Sans MS"/>
                 <a:cs typeface="Comic Sans MS"/>
                 <a:sym typeface="Euclid Symbol"/>
               </a:rPr>
-              <a:t>} </a:t>
+              <a:t>7</a:t>
+            </a:r>
+            <a:r>
+              <a:rPr lang="en-US" sz="6600" dirty="0">
+                <a:solidFill>
+                  <a:srgbClr val="0000CC"/>
+                </a:solidFill>
+                <a:latin typeface="Comic Sans MS"/>
+                <a:cs typeface="Comic Sans MS"/>
+                <a:sym typeface="Euclid Symbol"/>
+              </a:rPr>
+              <a:t>)</a:t>
+            </a:r>
+            <a:r>
+              <a:rPr lang="en-US" sz="6600" dirty="0" smtClean="0">
+                <a:solidFill>
+                  <a:srgbClr val="0000CC"/>
+                </a:solidFill>
+                <a:latin typeface="Comic Sans MS"/>
+                <a:cs typeface="Comic Sans MS"/>
+                <a:sym typeface="Euclid Symbol"/>
+              </a:rPr>
+              <a:t> </a:t>
             </a:r>
             <a:r>
               <a:rPr lang="en-US" sz="6600" dirty="0" smtClean="0">
@@ -15266,7 +15255,7 @@
       </p:sp>
       <p:sp>
         <p:nvSpPr>
-          <p:cNvPr id="7" name="Text Box 7"/>
+          <p:cNvPr id="9" name="Text Box 7"/>
           <p:cNvSpPr txBox="1">
             <a:spLocks noChangeArrowheads="1"/>
           </p:cNvSpPr>
@@ -15274,8 +15263,8 @@
         </p:nvSpPr>
         <p:spPr bwMode="auto">
           <a:xfrm>
-            <a:off x="152400" y="4343400"/>
-            <a:ext cx="8839755" cy="2215991"/>
+            <a:off x="0" y="4343400"/>
+            <a:ext cx="9144000" cy="2179058"/>
           </a:xfrm>
           <a:prstGeom prst="rect">
             <a:avLst/>
@@ -15289,7 +15278,7 @@
           </a:ln>
         </p:spPr>
         <p:txBody>
-          <a:bodyPr wrap="none">
+          <a:bodyPr wrap="square">
             <a:spAutoFit/>
           </a:bodyPr>
           <a:lstStyle/>
@@ -15373,20 +15362,27 @@
               <a:spcBef>
                 <a:spcPct val="20000"/>
               </a:spcBef>
-              <a:buFont typeface="Symbol" pitchFamily="18" charset="2"/>
-              <a:buNone/>
             </a:pPr>
             <a:r>
-              <a:rPr lang="en-US" sz="6000" dirty="0" smtClean="0">
+              <a:rPr lang="en-US" sz="5800" dirty="0" smtClean="0">
+                <a:solidFill>
+                  <a:srgbClr val="000000"/>
+                </a:solidFill>
+                <a:latin typeface="Comic Sans MS" pitchFamily="66" charset="0"/>
+              </a:rPr>
+              <a:t> {</a:t>
+            </a:r>
+            <a:r>
+              <a:rPr lang="en-US" sz="5800" dirty="0" smtClean="0">
                 <a:solidFill>
                   <a:schemeClr val="accent2"/>
                 </a:solidFill>
                 <a:latin typeface="Comic Sans MS" pitchFamily="66" charset="0"/>
               </a:rPr>
-              <a:t> 0,</a:t>
-            </a:r>
-            <a:r>
-              <a:rPr lang="en-US" sz="6000" dirty="0" smtClean="0">
+              <a:t>0,</a:t>
+            </a:r>
+            <a:r>
+              <a:rPr lang="en-US" sz="5800" dirty="0" smtClean="0">
                 <a:solidFill>
                   <a:srgbClr val="008000"/>
                 </a:solidFill>
@@ -15395,7 +15391,7 @@
               <a:t>1,</a:t>
             </a:r>
             <a:r>
-              <a:rPr lang="en-US" sz="6000" dirty="0" smtClean="0">
+              <a:rPr lang="en-US" sz="5800" dirty="0" smtClean="0">
                 <a:solidFill>
                   <a:schemeClr val="accent2"/>
                 </a:solidFill>
@@ -15404,7 +15400,7 @@
               <a:t>2,3,4</a:t>
             </a:r>
             <a:r>
-              <a:rPr lang="en-US" sz="6000" dirty="0" smtClean="0">
+              <a:rPr lang="en-US" sz="5800" dirty="0" smtClean="0">
                 <a:solidFill>
                   <a:srgbClr val="008000"/>
                 </a:solidFill>
@@ -15413,7 +15409,7 @@
               <a:t>,5,</a:t>
             </a:r>
             <a:r>
-              <a:rPr lang="en-US" sz="6000" dirty="0" smtClean="0">
+              <a:rPr lang="en-US" sz="5800" dirty="0" smtClean="0">
                 <a:solidFill>
                   <a:schemeClr val="accent2"/>
                 </a:solidFill>
@@ -15422,7 +15418,7 @@
               <a:t>6</a:t>
             </a:r>
             <a:r>
-              <a:rPr lang="en-US" sz="6000" dirty="0" smtClean="0">
+              <a:rPr lang="en-US" sz="5800" dirty="0" smtClean="0">
                 <a:solidFill>
                   <a:srgbClr val="008000"/>
                 </a:solidFill>
@@ -15431,7 +15427,7 @@
               <a:t>,7,</a:t>
             </a:r>
             <a:r>
-              <a:rPr lang="en-US" sz="6000" dirty="0" smtClean="0">
+              <a:rPr lang="en-US" sz="5800" dirty="0" smtClean="0">
                 <a:solidFill>
                   <a:schemeClr val="accent2"/>
                 </a:solidFill>
@@ -15440,7 +15436,7 @@
               <a:t>8,9,10</a:t>
             </a:r>
             <a:r>
-              <a:rPr lang="en-US" sz="6000" dirty="0" smtClean="0">
+              <a:rPr lang="en-US" sz="5800" dirty="0" smtClean="0">
                 <a:solidFill>
                   <a:srgbClr val="008000"/>
                 </a:solidFill>
@@ -15448,7 +15444,18 @@
               </a:rPr>
               <a:t>,11</a:t>
             </a:r>
-            <a:endParaRPr lang="en-US" sz="5400" dirty="0"/>
+            <a:r>
+              <a:rPr lang="en-US" sz="5800" kern="0" dirty="0">
+                <a:solidFill>
+                  <a:srgbClr val="000000"/>
+                </a:solidFill>
+                <a:latin typeface="Comic Sans MS"/>
+                <a:cs typeface="Courier New" pitchFamily="49" charset="0"/>
+                <a:sym typeface="Euclid Symbol" pitchFamily="18" charset="2"/>
+              </a:rPr>
+              <a:t>}</a:t>
+            </a:r>
+            <a:endParaRPr lang="en-US" sz="5800" dirty="0"/>
           </a:p>
         </p:txBody>
       </p:sp>
@@ -15462,14 +15469,14 @@
   <p:clrMapOvr>
     <a:masterClrMapping/>
   </p:clrMapOvr>
-  <mc:AlternateContent xmlns:mc="http://schemas.openxmlformats.org/markup-compatibility/2006" xmlns:p14="http://schemas.microsoft.com/office/powerpoint/2010/main">
-    <mc:Choice Requires="p14">
-      <p:transition spd="slow" p14:dur="900">
+  <mc:AlternateContent xmlns:mc="http://schemas.openxmlformats.org/markup-compatibility/2006">
+    <mc:Choice xmlns:p14="http://schemas.microsoft.com/office/powerpoint/2010/main" Requires="p14">
+      <p:transition spd="med" p14:dur="600">
         <p:fade/>
       </p:transition>
     </mc:Choice>
-    <mc:Fallback xmlns="">
-      <p:transition xmlns:p14="http://schemas.microsoft.com/office/powerpoint/2010/main" spd="slow">
+    <mc:Fallback>
+      <p:transition xmlns:p14="http://schemas.microsoft.com/office/powerpoint/2010/main" spd="med">
         <p:fade/>
       </p:transition>
     </mc:Fallback>
@@ -15830,133 +15837,7 @@
       </p:sp>
       <p:sp>
         <p:nvSpPr>
-          <p:cNvPr id="3" name="TextBox 2"/>
-          <p:cNvSpPr txBox="1"/>
-          <p:nvPr/>
-        </p:nvSpPr>
-        <p:spPr>
-          <a:xfrm>
-            <a:off x="595188" y="3276600"/>
-            <a:ext cx="5117907" cy="1107996"/>
-          </a:xfrm>
-          <a:prstGeom prst="rect">
-            <a:avLst/>
-          </a:prstGeom>
-          <a:noFill/>
-        </p:spPr>
-        <p:txBody>
-          <a:bodyPr wrap="none" rtlCol="0">
-            <a:spAutoFit/>
-          </a:bodyPr>
-          <a:lstStyle/>
-          <a:p>
-            <a:r>
-              <a:rPr lang="en-US" sz="6600" dirty="0">
-                <a:solidFill>
-                  <a:schemeClr val="accent1">
-                    <a:lumMod val="50000"/>
-                  </a:schemeClr>
-                </a:solidFill>
-                <a:latin typeface="Comic Sans MS"/>
-                <a:cs typeface="Comic Sans MS"/>
-                <a:sym typeface="Euclid Symbol"/>
-              </a:rPr>
-              <a:t> </a:t>
-            </a:r>
-            <a:r>
-              <a:rPr lang="en-US" sz="6600" dirty="0" smtClean="0">
-                <a:solidFill>
-                  <a:schemeClr val="accent1">
-                    <a:lumMod val="50000"/>
-                  </a:schemeClr>
-                </a:solidFill>
-                <a:latin typeface="Comic Sans MS"/>
-                <a:cs typeface="Comic Sans MS"/>
-                <a:sym typeface="Euclid Symbol"/>
-              </a:rPr>
-              <a:t> </a:t>
-            </a:r>
-            <a:r>
-              <a:rPr lang="en-US" sz="6600" b="1" dirty="0" err="1" smtClean="0">
-                <a:solidFill>
-                  <a:srgbClr val="0000CC"/>
-                </a:solidFill>
-                <a:latin typeface="Euclid Symbol" charset="2"/>
-                <a:cs typeface="Euclid Symbol" charset="2"/>
-                <a:sym typeface="Euclid Symbol"/>
-              </a:rPr>
-              <a:t>φ</a:t>
-            </a:r>
-            <a:r>
-              <a:rPr lang="en-US" sz="6600" dirty="0" smtClean="0">
-                <a:solidFill>
-                  <a:schemeClr val="accent1">
-                    <a:lumMod val="50000"/>
-                  </a:schemeClr>
-                </a:solidFill>
-                <a:latin typeface="Comic Sans MS"/>
-                <a:cs typeface="Comic Sans MS"/>
-                <a:sym typeface="Euclid Symbol"/>
-              </a:rPr>
-              <a:t>{7</a:t>
-            </a:r>
-            <a:r>
-              <a:rPr lang="en-US" sz="6600" dirty="0" smtClean="0">
-                <a:solidFill>
-                  <a:srgbClr val="0000CC"/>
-                </a:solidFill>
-                <a:latin typeface="Comic Sans MS"/>
-                <a:cs typeface="Comic Sans MS"/>
-                <a:sym typeface="Euclid Symbol"/>
-              </a:rPr>
-              <a:t>} </a:t>
-            </a:r>
-            <a:r>
-              <a:rPr lang="en-US" sz="6600" dirty="0" smtClean="0">
-                <a:solidFill>
-                  <a:srgbClr val="0000CC"/>
-                </a:solidFill>
-                <a:cs typeface="Comic Sans MS"/>
-                <a:sym typeface="Euclid Symbol"/>
-              </a:rPr>
-              <a:t> </a:t>
-            </a:r>
-            <a:r>
-              <a:rPr lang="en-US" sz="6600" b="1" dirty="0" smtClean="0">
-                <a:solidFill>
-                  <a:srgbClr val="000000"/>
-                </a:solidFill>
-                <a:latin typeface="Euclid Symbol" charset="2"/>
-                <a:cs typeface="Euclid Symbol" charset="2"/>
-                <a:sym typeface="Euclid Symbol"/>
-              </a:rPr>
-              <a:t>=</a:t>
-            </a:r>
-            <a:r>
-              <a:rPr lang="en-US" sz="6600" dirty="0" smtClean="0">
-                <a:solidFill>
-                  <a:srgbClr val="0000CC"/>
-                </a:solidFill>
-                <a:cs typeface="Comic Sans MS"/>
-                <a:sym typeface="Euclid Symbol"/>
-              </a:rPr>
-              <a:t>     </a:t>
-            </a:r>
-            <a:r>
-              <a:rPr lang="en-US" sz="6600" dirty="0" smtClean="0">
-                <a:solidFill>
-                  <a:srgbClr val="0000CC"/>
-                </a:solidFill>
-                <a:latin typeface="Comic Sans MS" pitchFamily="66" charset="0"/>
-              </a:rPr>
-              <a:t>6</a:t>
-            </a:r>
-          </a:p>
-        </p:txBody>
-      </p:sp>
-      <p:sp>
-        <p:nvSpPr>
-          <p:cNvPr id="9" name="Text Box 7"/>
+          <p:cNvPr id="10" name="Text Box 7"/>
           <p:cNvSpPr txBox="1">
             <a:spLocks noChangeArrowheads="1"/>
           </p:cNvSpPr>
@@ -15964,8 +15845,8 @@
         </p:nvSpPr>
         <p:spPr bwMode="auto">
           <a:xfrm>
-            <a:off x="0" y="4267200"/>
-            <a:ext cx="8909537" cy="2215991"/>
+            <a:off x="0" y="4343400"/>
+            <a:ext cx="9144000" cy="2142125"/>
           </a:xfrm>
           <a:prstGeom prst="rect">
             <a:avLst/>
@@ -16015,7 +15896,7 @@
                 <a:cs typeface="Comic Sans MS"/>
                 <a:sym typeface="Euclid Symbol"/>
               </a:rPr>
-              <a:t>   </a:t>
+              <a:t>     </a:t>
             </a:r>
             <a:r>
               <a:rPr lang="en-US" sz="6600" b="1" dirty="0" err="1" smtClean="0">
@@ -16029,7 +15910,7 @@
               <a:t>φ</a:t>
             </a:r>
             <a:r>
-              <a:rPr lang="en-US" sz="6600" dirty="0">
+              <a:rPr lang="en-US" sz="6600" dirty="0" smtClean="0">
                 <a:solidFill>
                   <a:schemeClr val="accent1">
                     <a:lumMod val="50000"/>
@@ -16039,10 +15920,10 @@
                 <a:cs typeface="Comic Sans MS"/>
                 <a:sym typeface="Euclid Symbol"/>
               </a:rPr>
-              <a:t>{12</a:t>
-            </a:r>
-            <a:r>
-              <a:rPr lang="en-US" sz="6600" dirty="0">
+              <a:t>(12</a:t>
+            </a:r>
+            <a:r>
+              <a:rPr lang="en-US" sz="6600" dirty="0" smtClean="0">
                 <a:solidFill>
                   <a:srgbClr val="0000CC"/>
                 </a:solidFill>
@@ -16050,10 +15931,10 @@
                 <a:cs typeface="Comic Sans MS"/>
                 <a:sym typeface="Euclid Symbol"/>
               </a:rPr>
-              <a:t>}</a:t>
-            </a:r>
-            <a:r>
-              <a:rPr lang="en-US" sz="6600" dirty="0">
+              <a:t>)</a:t>
+            </a:r>
+            <a:r>
+              <a:rPr lang="en-US" sz="6600" dirty="0" smtClean="0">
                 <a:solidFill>
                   <a:srgbClr val="0000CC"/>
                 </a:solidFill>
@@ -16061,16 +15942,6 @@
                 <a:sym typeface="Euclid Symbol"/>
               </a:rPr>
               <a:t> </a:t>
-            </a:r>
-            <a:r>
-              <a:rPr lang="en-US" sz="6600" dirty="0" smtClean="0">
-                <a:solidFill>
-                  <a:srgbClr val="0000CC"/>
-                </a:solidFill>
-                <a:cs typeface="Comic Sans MS"/>
-                <a:sym typeface="Euclid Symbol"/>
-              </a:rPr>
-              <a:t>  </a:t>
             </a:r>
             <a:r>
               <a:rPr lang="en-US" sz="6600" b="1" dirty="0" smtClean="0">
@@ -16097,11 +15968,9 @@
               <a:spcBef>
                 <a:spcPct val="20000"/>
               </a:spcBef>
-              <a:buFont typeface="Symbol" pitchFamily="18" charset="2"/>
-              <a:buNone/>
             </a:pPr>
             <a:r>
-              <a:rPr lang="en-US" sz="6000" kern="0" dirty="0" smtClean="0">
+              <a:rPr lang="en-US" sz="5600" kern="0" dirty="0" smtClean="0">
                 <a:solidFill>
                   <a:srgbClr val="AD0E97"/>
                 </a:solidFill>
@@ -16112,79 +15981,99 @@
               <a:t>|</a:t>
             </a:r>
             <a:r>
-              <a:rPr lang="en-US" sz="5800" dirty="0" smtClean="0">
+              <a:rPr lang="en-US" sz="5600" dirty="0" smtClean="0">
+                <a:solidFill>
+                  <a:srgbClr val="000000"/>
+                </a:solidFill>
+                <a:latin typeface="Comic Sans MS" pitchFamily="66" charset="0"/>
+              </a:rPr>
+              <a:t>{ </a:t>
+            </a:r>
+            <a:r>
+              <a:rPr lang="en-US" sz="5600" dirty="0" smtClean="0">
                 <a:solidFill>
                   <a:schemeClr val="accent2"/>
                 </a:solidFill>
                 <a:latin typeface="Comic Sans MS" pitchFamily="66" charset="0"/>
               </a:rPr>
-              <a:t>0,</a:t>
-            </a:r>
-            <a:r>
-              <a:rPr lang="en-US" sz="5800" dirty="0" smtClean="0">
+              <a:t> </a:t>
+            </a:r>
+            <a:r>
+              <a:rPr lang="en-US" sz="5600" dirty="0" smtClean="0">
                 <a:solidFill>
                   <a:srgbClr val="008000"/>
                 </a:solidFill>
                 <a:latin typeface="Comic Sans MS" pitchFamily="66" charset="0"/>
               </a:rPr>
-              <a:t>1,</a:t>
-            </a:r>
-            <a:r>
-              <a:rPr lang="en-US" sz="5800" dirty="0" smtClean="0">
+              <a:t>1,     </a:t>
+            </a:r>
+            <a:r>
+              <a:rPr lang="en-US" sz="5600" dirty="0" smtClean="0">
                 <a:solidFill>
                   <a:schemeClr val="accent2"/>
                 </a:solidFill>
                 <a:latin typeface="Comic Sans MS" pitchFamily="66" charset="0"/>
               </a:rPr>
-              <a:t>2,3,4</a:t>
-            </a:r>
-            <a:r>
-              <a:rPr lang="en-US" sz="5800" dirty="0" smtClean="0">
+              <a:t> </a:t>
+            </a:r>
+            <a:r>
+              <a:rPr lang="en-US" sz="5600" dirty="0" smtClean="0">
                 <a:solidFill>
                   <a:srgbClr val="008000"/>
                 </a:solidFill>
                 <a:latin typeface="Comic Sans MS" pitchFamily="66" charset="0"/>
               </a:rPr>
-              <a:t>,5,</a:t>
-            </a:r>
-            <a:r>
-              <a:rPr lang="en-US" sz="5800" dirty="0" smtClean="0">
+              <a:t>5,</a:t>
+            </a:r>
+            <a:r>
+              <a:rPr lang="en-US" sz="5600" dirty="0" smtClean="0">
                 <a:solidFill>
                   <a:schemeClr val="accent2"/>
                 </a:solidFill>
                 <a:latin typeface="Comic Sans MS" pitchFamily="66" charset="0"/>
               </a:rPr>
-              <a:t>6</a:t>
-            </a:r>
-            <a:r>
-              <a:rPr lang="en-US" sz="5800" dirty="0" smtClean="0">
+              <a:t>   </a:t>
+            </a:r>
+            <a:r>
+              <a:rPr lang="en-US" sz="5600" dirty="0" smtClean="0">
                 <a:solidFill>
                   <a:srgbClr val="008000"/>
                 </a:solidFill>
                 <a:latin typeface="Comic Sans MS" pitchFamily="66" charset="0"/>
               </a:rPr>
-              <a:t>,7,</a:t>
-            </a:r>
-            <a:r>
-              <a:rPr lang="en-US" sz="5800" dirty="0" smtClean="0">
+              <a:t>7,     </a:t>
+            </a:r>
+            <a:r>
+              <a:rPr lang="en-US" sz="5600" dirty="0" smtClean="0">
                 <a:solidFill>
                   <a:schemeClr val="accent2"/>
                 </a:solidFill>
                 <a:latin typeface="Comic Sans MS" pitchFamily="66" charset="0"/>
               </a:rPr>
-              <a:t>8,9,10</a:t>
-            </a:r>
-            <a:r>
-              <a:rPr lang="en-US" sz="5800" dirty="0" smtClean="0">
+              <a:t>       </a:t>
+            </a:r>
+            <a:r>
+              <a:rPr lang="en-US" sz="5600" dirty="0" smtClean="0">
                 <a:solidFill>
                   <a:srgbClr val="008000"/>
                 </a:solidFill>
                 <a:latin typeface="Comic Sans MS" pitchFamily="66" charset="0"/>
               </a:rPr>
-              <a:t>,11</a:t>
-            </a:r>
-            <a:r>
-              <a:rPr lang="en-US" sz="5400" kern="0" dirty="0">
+              <a:t>11</a:t>
+            </a:r>
+            <a:r>
+              <a:rPr lang="en-US" sz="5600" kern="0" dirty="0" smtClean="0">
+                <a:solidFill>
+                  <a:srgbClr val="000000"/>
+                </a:solidFill>
+                <a:latin typeface="Comic Sans MS"/>
+                <a:cs typeface="Courier New" pitchFamily="49" charset="0"/>
+                <a:sym typeface="Euclid Symbol" pitchFamily="18" charset="2"/>
+              </a:rPr>
+              <a:t>}</a:t>
+            </a:r>
+            <a:r>
+              <a:rPr lang="en-US" sz="5600" kern="0" dirty="0">
                 <a:solidFill>
                   <a:srgbClr val="AD0E97"/>
                 </a:solidFill>
@@ -16194,7 +16083,157 @@
               </a:rPr>
               <a:t>|</a:t>
             </a:r>
-            <a:endParaRPr lang="en-US" sz="5400" dirty="0"/>
+            <a:endParaRPr lang="en-US" sz="5600" dirty="0"/>
+          </a:p>
+        </p:txBody>
+      </p:sp>
+      <p:sp>
+        <p:nvSpPr>
+          <p:cNvPr id="11" name="TextBox 10"/>
+          <p:cNvSpPr txBox="1"/>
+          <p:nvPr/>
+        </p:nvSpPr>
+        <p:spPr>
+          <a:xfrm>
+            <a:off x="381000" y="3276600"/>
+            <a:ext cx="5117907" cy="1107996"/>
+          </a:xfrm>
+          <a:prstGeom prst="rect">
+            <a:avLst/>
+          </a:prstGeom>
+          <a:noFill/>
+        </p:spPr>
+        <p:txBody>
+          <a:bodyPr wrap="none" rtlCol="0">
+            <a:spAutoFit/>
+          </a:bodyPr>
+          <a:lstStyle/>
+          <a:p>
+            <a:r>
+              <a:rPr lang="en-US" sz="6600" dirty="0">
+                <a:solidFill>
+                  <a:schemeClr val="accent1">
+                    <a:lumMod val="50000"/>
+                  </a:schemeClr>
+                </a:solidFill>
+                <a:latin typeface="Comic Sans MS"/>
+                <a:cs typeface="Comic Sans MS"/>
+                <a:sym typeface="Euclid Symbol"/>
+              </a:rPr>
+              <a:t> </a:t>
+            </a:r>
+            <a:r>
+              <a:rPr lang="en-US" sz="6600" dirty="0" smtClean="0">
+                <a:solidFill>
+                  <a:schemeClr val="accent1">
+                    <a:lumMod val="50000"/>
+                  </a:schemeClr>
+                </a:solidFill>
+                <a:latin typeface="Comic Sans MS"/>
+                <a:cs typeface="Comic Sans MS"/>
+                <a:sym typeface="Euclid Symbol"/>
+              </a:rPr>
+              <a:t> </a:t>
+            </a:r>
+            <a:r>
+              <a:rPr lang="en-US" sz="6600" b="1" dirty="0" err="1" smtClean="0">
+                <a:solidFill>
+                  <a:srgbClr val="0000CC"/>
+                </a:solidFill>
+                <a:latin typeface="Euclid Symbol" charset="2"/>
+                <a:cs typeface="Euclid Symbol" charset="2"/>
+                <a:sym typeface="Euclid Symbol"/>
+              </a:rPr>
+              <a:t>φ</a:t>
+            </a:r>
+            <a:r>
+              <a:rPr lang="en-US" sz="6600" dirty="0">
+                <a:solidFill>
+                  <a:schemeClr val="accent1">
+                    <a:lumMod val="50000"/>
+                  </a:schemeClr>
+                </a:solidFill>
+                <a:latin typeface="Comic Sans MS"/>
+                <a:cs typeface="Comic Sans MS"/>
+                <a:sym typeface="Euclid Symbol"/>
+              </a:rPr>
+              <a:t>(</a:t>
+            </a:r>
+            <a:r>
+              <a:rPr lang="en-US" sz="6600" dirty="0" smtClean="0">
+                <a:solidFill>
+                  <a:schemeClr val="accent1">
+                    <a:lumMod val="50000"/>
+                  </a:schemeClr>
+                </a:solidFill>
+                <a:latin typeface="Comic Sans MS"/>
+                <a:cs typeface="Comic Sans MS"/>
+                <a:sym typeface="Euclid Symbol"/>
+              </a:rPr>
+              <a:t>7</a:t>
+            </a:r>
+            <a:r>
+              <a:rPr lang="en-US" sz="6600" dirty="0">
+                <a:solidFill>
+                  <a:srgbClr val="0000CC"/>
+                </a:solidFill>
+                <a:latin typeface="Comic Sans MS"/>
+                <a:cs typeface="Comic Sans MS"/>
+                <a:sym typeface="Euclid Symbol"/>
+              </a:rPr>
+              <a:t>)</a:t>
+            </a:r>
+            <a:r>
+              <a:rPr lang="en-US" sz="6600" dirty="0" smtClean="0">
+                <a:solidFill>
+                  <a:srgbClr val="0000CC"/>
+                </a:solidFill>
+                <a:latin typeface="Comic Sans MS"/>
+                <a:cs typeface="Comic Sans MS"/>
+                <a:sym typeface="Euclid Symbol"/>
+              </a:rPr>
+              <a:t> </a:t>
+            </a:r>
+            <a:r>
+              <a:rPr lang="en-US" sz="6600" dirty="0" smtClean="0">
+                <a:solidFill>
+                  <a:srgbClr val="0000CC"/>
+                </a:solidFill>
+                <a:cs typeface="Comic Sans MS"/>
+                <a:sym typeface="Euclid Symbol"/>
+              </a:rPr>
+              <a:t> </a:t>
+            </a:r>
+            <a:r>
+              <a:rPr lang="en-US" sz="6600" b="1" dirty="0" smtClean="0">
+                <a:solidFill>
+                  <a:srgbClr val="000000"/>
+                </a:solidFill>
+                <a:latin typeface="Euclid Symbol" charset="2"/>
+                <a:cs typeface="Euclid Symbol" charset="2"/>
+                <a:sym typeface="Euclid Symbol"/>
+              </a:rPr>
+              <a:t>=</a:t>
+            </a:r>
+            <a:r>
+              <a:rPr lang="en-US" sz="6600" dirty="0" smtClean="0">
+                <a:solidFill>
+                  <a:srgbClr val="0000CC"/>
+                </a:solidFill>
+                <a:cs typeface="Comic Sans MS"/>
+                <a:sym typeface="Euclid Symbol"/>
+              </a:rPr>
+              <a:t>     </a:t>
+            </a:r>
+            <a:r>
+              <a:rPr lang="en-US" sz="6600" dirty="0" smtClean="0">
+                <a:solidFill>
+                  <a:srgbClr val="0000CC"/>
+                </a:solidFill>
+                <a:latin typeface="Comic Sans MS" pitchFamily="66" charset="0"/>
+              </a:rPr>
+              <a:t>6</a:t>
+            </a:r>
           </a:p>
         </p:txBody>
       </p:sp>
@@ -16576,13 +16615,13 @@
       </p:sp>
       <p:sp>
         <p:nvSpPr>
-          <p:cNvPr id="3" name="TextBox 2"/>
+          <p:cNvPr id="9" name="TextBox 8"/>
           <p:cNvSpPr txBox="1"/>
           <p:nvPr/>
         </p:nvSpPr>
         <p:spPr>
           <a:xfrm>
-            <a:off x="595188" y="3276600"/>
+            <a:off x="381000" y="3276600"/>
             <a:ext cx="5117907" cy="1107996"/>
           </a:xfrm>
           <a:prstGeom prst="rect">
@@ -16634,7 +16673,7 @@
               <a:t>φ</a:t>
             </a:r>
             <a:r>
-              <a:rPr lang="en-US" sz="6600" dirty="0" smtClean="0">
+              <a:rPr lang="en-US" sz="6600" dirty="0">
                 <a:solidFill>
                   <a:schemeClr val="accent1">
                     <a:lumMod val="50000"/>
@@ -16644,18 +16683,42 @@
                 <a:cs typeface="Comic Sans MS"/>
                 <a:sym typeface="Euclid Symbol"/>
               </a:rPr>
-              <a:t>{7</a:t>
+              <a:t>(</a:t>
             </a:r>
             <a:r>
               <a:rPr lang="en-US" sz="6600" dirty="0" smtClean="0">
                 <a:solidFill>
-                  <a:srgbClr val="0000CC"/>
+                  <a:schemeClr val="accent1">
+                    <a:lumMod val="50000"/>
+                  </a:schemeClr>
                 </a:solidFill>
                 <a:latin typeface="Comic Sans MS"/>
                 <a:cs typeface="Comic Sans MS"/>
                 <a:sym typeface="Euclid Symbol"/>
               </a:rPr>
-              <a:t>} </a:t>
+              <a:t>7</a:t>
+            </a:r>
+            <a:r>
+              <a:rPr lang="en-US" sz="6600" dirty="0">
+                <a:solidFill>
+                  <a:srgbClr val="0000CC"/>
+                </a:solidFill>
+                <a:latin typeface="Comic Sans MS"/>
+                <a:cs typeface="Comic Sans MS"/>
+                <a:sym typeface="Euclid Symbol"/>
+              </a:rPr>
+              <a:t>)</a:t>
+            </a:r>
+            <a:r>
+              <a:rPr lang="en-US" sz="6600" dirty="0" smtClean="0">
+                <a:solidFill>
+                  <a:srgbClr val="0000CC"/>
+                </a:solidFill>
+                <a:latin typeface="Comic Sans MS"/>
+                <a:cs typeface="Comic Sans MS"/>
+                <a:sym typeface="Euclid Symbol"/>
+              </a:rPr>
+              <a:t> </a:t>
             </a:r>
             <a:r>
               <a:rPr lang="en-US" sz="6600" dirty="0" smtClean="0">
@@ -16676,7 +16739,7 @@
                 <a:cs typeface="Euclid Symbol" charset="2"/>
                 <a:sym typeface="Euclid Symbol"/>
               </a:rPr>
-              <a:t>=   </a:t>
+              <a:t>=</a:t>
             </a:r>
             <a:r>
               <a:rPr lang="en-US" sz="6600" dirty="0" smtClean="0">
@@ -16686,7 +16749,7 @@
                 <a:cs typeface="Comic Sans MS"/>
                 <a:sym typeface="Euclid Symbol"/>
               </a:rPr>
-              <a:t>  </a:t>
+              <a:t>     </a:t>
             </a:r>
             <a:r>
               <a:rPr lang="en-US" sz="6600" dirty="0" smtClean="0">
@@ -16702,7 +16765,7 @@
       </p:sp>
       <p:sp>
         <p:nvSpPr>
-          <p:cNvPr id="7" name="Text Box 7"/>
+          <p:cNvPr id="10" name="Text Box 7"/>
           <p:cNvSpPr txBox="1">
             <a:spLocks noChangeArrowheads="1"/>
           </p:cNvSpPr>
@@ -16710,8 +16773,8 @@
         </p:nvSpPr>
         <p:spPr bwMode="auto">
           <a:xfrm>
-            <a:off x="0" y="4267200"/>
-            <a:ext cx="8909537" cy="1107996"/>
+            <a:off x="0" y="4343400"/>
+            <a:ext cx="7467600" cy="1107996"/>
           </a:xfrm>
           <a:prstGeom prst="rect">
             <a:avLst/>
@@ -16761,7 +16824,7 @@
                 <a:cs typeface="Comic Sans MS"/>
                 <a:sym typeface="Euclid Symbol"/>
               </a:rPr>
-              <a:t>   </a:t>
+              <a:t>     </a:t>
             </a:r>
             <a:r>
               <a:rPr lang="en-US" sz="6600" b="1" dirty="0" err="1" smtClean="0">
@@ -16775,7 +16838,7 @@
               <a:t>φ</a:t>
             </a:r>
             <a:r>
-              <a:rPr lang="en-US" sz="6600" dirty="0">
+              <a:rPr lang="en-US" sz="6600" dirty="0" smtClean="0">
                 <a:solidFill>
                   <a:schemeClr val="accent1">
                     <a:lumMod val="50000"/>
@@ -16785,10 +16848,10 @@
                 <a:cs typeface="Comic Sans MS"/>
                 <a:sym typeface="Euclid Symbol"/>
               </a:rPr>
-              <a:t>{12</a:t>
-            </a:r>
-            <a:r>
-              <a:rPr lang="en-US" sz="6600" dirty="0">
+              <a:t>(12</a:t>
+            </a:r>
+            <a:r>
+              <a:rPr lang="en-US" sz="6600" dirty="0" smtClean="0">
                 <a:solidFill>
                   <a:srgbClr val="0000CC"/>
                 </a:solidFill>
@@ -16796,10 +16859,10 @@
                 <a:cs typeface="Comic Sans MS"/>
                 <a:sym typeface="Euclid Symbol"/>
               </a:rPr>
-              <a:t>}</a:t>
-            </a:r>
-            <a:r>
-              <a:rPr lang="en-US" sz="6600" dirty="0">
+              <a:t>)</a:t>
+            </a:r>
+            <a:r>
+              <a:rPr lang="en-US" sz="6600" dirty="0" smtClean="0">
                 <a:solidFill>
                   <a:srgbClr val="0000CC"/>
                 </a:solidFill>
@@ -16807,16 +16870,6 @@
                 <a:sym typeface="Euclid Symbol"/>
               </a:rPr>
               <a:t> </a:t>
-            </a:r>
-            <a:r>
-              <a:rPr lang="en-US" sz="6600" dirty="0" smtClean="0">
-                <a:solidFill>
-                  <a:srgbClr val="0000CC"/>
-                </a:solidFill>
-                <a:cs typeface="Comic Sans MS"/>
-                <a:sym typeface="Euclid Symbol"/>
-              </a:rPr>
-              <a:t>  </a:t>
             </a:r>
             <a:r>
               <a:rPr lang="en-US" sz="6600" b="1" dirty="0" smtClean="0">
@@ -16827,7 +16880,7 @@
                 <a:cs typeface="Euclid Symbol" charset="2"/>
                 <a:sym typeface="Euclid Symbol"/>
               </a:rPr>
-              <a:t>=   </a:t>
+              <a:t>= </a:t>
             </a:r>
             <a:r>
               <a:rPr lang="en-US" sz="6600" dirty="0" smtClean="0">
@@ -16838,7 +16891,7 @@
               </a:rPr>
               <a:t>4</a:t>
             </a:r>
-            <a:endParaRPr lang="en-US" sz="5400" dirty="0"/>
+            <a:endParaRPr lang="en-US" sz="5600" dirty="0"/>
           </a:p>
         </p:txBody>
       </p:sp>
@@ -16852,14 +16905,14 @@
   <p:clrMapOvr>
     <a:masterClrMapping/>
   </p:clrMapOvr>
-  <mc:AlternateContent xmlns:mc="http://schemas.openxmlformats.org/markup-compatibility/2006" xmlns:p14="http://schemas.microsoft.com/office/powerpoint/2010/main">
-    <mc:Choice Requires="p14">
-      <p:transition spd="slow" p14:dur="900">
+  <mc:AlternateContent xmlns:mc="http://schemas.openxmlformats.org/markup-compatibility/2006">
+    <mc:Choice xmlns:p14="http://schemas.microsoft.com/office/powerpoint/2010/main" Requires="p14">
+      <p:transition spd="med" p14:dur="600">
         <p:fade/>
       </p:transition>
     </mc:Choice>
-    <mc:Fallback xmlns="">
-      <p:transition xmlns:p14="http://schemas.microsoft.com/office/powerpoint/2010/main" spd="slow">
+    <mc:Fallback>
+      <p:transition xmlns:p14="http://schemas.microsoft.com/office/powerpoint/2010/main" spd="med">
         <p:fade/>
       </p:transition>
     </mc:Fallback>

</xml_diff>